<commit_message>
track payload bytes transfered between peers
</commit_message>
<xml_diff>
--- a/doc.pptx
+++ b/doc.pptx
@@ -8,6 +8,8 @@
     <p:sldId id="256" r:id="rId2"/>
     <p:sldId id="257" r:id="rId3"/>
     <p:sldId id="258" r:id="rId4"/>
+    <p:sldId id="260" r:id="rId5"/>
+    <p:sldId id="259" r:id="rId6"/>
   </p:sldIdLst>
   <p:sldSz cx="9144000" cy="6858000" type="screen4x3"/>
   <p:notesSz cx="6858000" cy="9144000"/>
@@ -290,7 +292,7 @@
           <a:p>
             <a:fld id="{4AC144A4-B9B9-42EE-ACC2-5FCCE8D897E3}" type="datetimeFigureOut">
               <a:rPr lang="en-US" smtClean="0"/>
-              <a:t>7/10/2020</a:t>
+              <a:t>7/11/2020</a:t>
             </a:fld>
             <a:endParaRPr lang="en-US"/>
           </a:p>
@@ -460,7 +462,7 @@
           <a:p>
             <a:fld id="{4AC144A4-B9B9-42EE-ACC2-5FCCE8D897E3}" type="datetimeFigureOut">
               <a:rPr lang="en-US" smtClean="0"/>
-              <a:t>7/10/2020</a:t>
+              <a:t>7/11/2020</a:t>
             </a:fld>
             <a:endParaRPr lang="en-US"/>
           </a:p>
@@ -640,7 +642,7 @@
           <a:p>
             <a:fld id="{4AC144A4-B9B9-42EE-ACC2-5FCCE8D897E3}" type="datetimeFigureOut">
               <a:rPr lang="en-US" smtClean="0"/>
-              <a:t>7/10/2020</a:t>
+              <a:t>7/11/2020</a:t>
             </a:fld>
             <a:endParaRPr lang="en-US"/>
           </a:p>
@@ -810,7 +812,7 @@
           <a:p>
             <a:fld id="{4AC144A4-B9B9-42EE-ACC2-5FCCE8D897E3}" type="datetimeFigureOut">
               <a:rPr lang="en-US" smtClean="0"/>
-              <a:t>7/10/2020</a:t>
+              <a:t>7/11/2020</a:t>
             </a:fld>
             <a:endParaRPr lang="en-US"/>
           </a:p>
@@ -1056,7 +1058,7 @@
           <a:p>
             <a:fld id="{4AC144A4-B9B9-42EE-ACC2-5FCCE8D897E3}" type="datetimeFigureOut">
               <a:rPr lang="en-US" smtClean="0"/>
-              <a:t>7/10/2020</a:t>
+              <a:t>7/11/2020</a:t>
             </a:fld>
             <a:endParaRPr lang="en-US"/>
           </a:p>
@@ -1344,7 +1346,7 @@
           <a:p>
             <a:fld id="{4AC144A4-B9B9-42EE-ACC2-5FCCE8D897E3}" type="datetimeFigureOut">
               <a:rPr lang="en-US" smtClean="0"/>
-              <a:t>7/10/2020</a:t>
+              <a:t>7/11/2020</a:t>
             </a:fld>
             <a:endParaRPr lang="en-US"/>
           </a:p>
@@ -1766,7 +1768,7 @@
           <a:p>
             <a:fld id="{4AC144A4-B9B9-42EE-ACC2-5FCCE8D897E3}" type="datetimeFigureOut">
               <a:rPr lang="en-US" smtClean="0"/>
-              <a:t>7/10/2020</a:t>
+              <a:t>7/11/2020</a:t>
             </a:fld>
             <a:endParaRPr lang="en-US"/>
           </a:p>
@@ -1884,7 +1886,7 @@
           <a:p>
             <a:fld id="{4AC144A4-B9B9-42EE-ACC2-5FCCE8D897E3}" type="datetimeFigureOut">
               <a:rPr lang="en-US" smtClean="0"/>
-              <a:t>7/10/2020</a:t>
+              <a:t>7/11/2020</a:t>
             </a:fld>
             <a:endParaRPr lang="en-US"/>
           </a:p>
@@ -1979,7 +1981,7 @@
           <a:p>
             <a:fld id="{4AC144A4-B9B9-42EE-ACC2-5FCCE8D897E3}" type="datetimeFigureOut">
               <a:rPr lang="en-US" smtClean="0"/>
-              <a:t>7/10/2020</a:t>
+              <a:t>7/11/2020</a:t>
             </a:fld>
             <a:endParaRPr lang="en-US"/>
           </a:p>
@@ -2256,7 +2258,7 @@
           <a:p>
             <a:fld id="{4AC144A4-B9B9-42EE-ACC2-5FCCE8D897E3}" type="datetimeFigureOut">
               <a:rPr lang="en-US" smtClean="0"/>
-              <a:t>7/10/2020</a:t>
+              <a:t>7/11/2020</a:t>
             </a:fld>
             <a:endParaRPr lang="en-US"/>
           </a:p>
@@ -2509,7 +2511,7 @@
           <a:p>
             <a:fld id="{4AC144A4-B9B9-42EE-ACC2-5FCCE8D897E3}" type="datetimeFigureOut">
               <a:rPr lang="en-US" smtClean="0"/>
-              <a:t>7/10/2020</a:t>
+              <a:t>7/11/2020</a:t>
             </a:fld>
             <a:endParaRPr lang="en-US"/>
           </a:p>
@@ -2722,7 +2724,7 @@
           <a:p>
             <a:fld id="{4AC144A4-B9B9-42EE-ACC2-5FCCE8D897E3}" type="datetimeFigureOut">
               <a:rPr lang="en-US" smtClean="0"/>
-              <a:t>7/10/2020</a:t>
+              <a:t>7/11/2020</a:t>
             </a:fld>
             <a:endParaRPr lang="en-US"/>
           </a:p>
@@ -3671,6 +3673,666 @@
     <p:extLst>
       <p:ext uri="{BB962C8B-B14F-4D97-AF65-F5344CB8AC3E}">
         <p14:creationId xmlns:p14="http://schemas.microsoft.com/office/powerpoint/2010/main" val="4201289273"/>
+      </p:ext>
+    </p:extLst>
+  </p:cSld>
+  <p:clrMapOvr>
+    <a:masterClrMapping/>
+  </p:clrMapOvr>
+</p:sld>
+</file>
+
+<file path=ppt/slides/slide4.xml><?xml version="1.0" encoding="utf-8"?>
+<p:sld xmlns:a="http://schemas.openxmlformats.org/drawingml/2006/main" xmlns:r="http://schemas.openxmlformats.org/officeDocument/2006/relationships" xmlns:p="http://schemas.openxmlformats.org/presentationml/2006/main">
+  <p:cSld>
+    <p:spTree>
+      <p:nvGrpSpPr>
+        <p:cNvPr id="1" name=""/>
+        <p:cNvGrpSpPr/>
+        <p:nvPr/>
+      </p:nvGrpSpPr>
+      <p:grpSpPr>
+        <a:xfrm>
+          <a:off x="0" y="0"/>
+          <a:ext cx="0" cy="0"/>
+          <a:chOff x="0" y="0"/>
+          <a:chExt cx="0" cy="0"/>
+        </a:xfrm>
+      </p:grpSpPr>
+      <p:sp>
+        <p:nvSpPr>
+          <p:cNvPr id="4" name="Rectangle 3"/>
+          <p:cNvSpPr/>
+          <p:nvPr/>
+        </p:nvSpPr>
+        <p:spPr>
+          <a:xfrm>
+            <a:off x="4034519" y="2057400"/>
+            <a:ext cx="914400" cy="914400"/>
+          </a:xfrm>
+          <a:prstGeom prst="rect">
+            <a:avLst/>
+          </a:prstGeom>
+          <a:solidFill>
+            <a:schemeClr val="bg1"/>
+          </a:solidFill>
+        </p:spPr>
+        <p:style>
+          <a:lnRef idx="2">
+            <a:schemeClr val="accent1">
+              <a:shade val="50000"/>
+            </a:schemeClr>
+          </a:lnRef>
+          <a:fillRef idx="1">
+            <a:schemeClr val="accent1"/>
+          </a:fillRef>
+          <a:effectRef idx="0">
+            <a:schemeClr val="accent1"/>
+          </a:effectRef>
+          <a:fontRef idx="minor">
+            <a:schemeClr val="lt1"/>
+          </a:fontRef>
+        </p:style>
+        <p:txBody>
+          <a:bodyPr rtlCol="0" anchor="ctr"/>
+          <a:lstStyle/>
+          <a:p>
+            <a:pPr algn="ctr"/>
+            <a:r>
+              <a:rPr lang="en-US" sz="900" b="1" dirty="0" smtClean="0">
+                <a:solidFill>
+                  <a:schemeClr val="tx1"/>
+                </a:solidFill>
+              </a:rPr>
+              <a:t>Connection</a:t>
+            </a:r>
+          </a:p>
+          <a:p>
+            <a:pPr algn="ctr"/>
+            <a:r>
+              <a:rPr lang="en-US" sz="900" dirty="0" smtClean="0">
+                <a:solidFill>
+                  <a:schemeClr val="tx1"/>
+                </a:solidFill>
+              </a:rPr>
+              <a:t>- information exchange service</a:t>
+            </a:r>
+            <a:endParaRPr lang="en-US" sz="900" dirty="0">
+              <a:solidFill>
+                <a:schemeClr val="tx1"/>
+              </a:solidFill>
+            </a:endParaRPr>
+          </a:p>
+        </p:txBody>
+      </p:sp>
+      <p:sp>
+        <p:nvSpPr>
+          <p:cNvPr id="5" name="Rectangle 4"/>
+          <p:cNvSpPr/>
+          <p:nvPr/>
+        </p:nvSpPr>
+        <p:spPr>
+          <a:xfrm>
+            <a:off x="1695450" y="2057400"/>
+            <a:ext cx="914400" cy="914400"/>
+          </a:xfrm>
+          <a:prstGeom prst="rect">
+            <a:avLst/>
+          </a:prstGeom>
+          <a:solidFill>
+            <a:schemeClr val="bg1"/>
+          </a:solidFill>
+        </p:spPr>
+        <p:style>
+          <a:lnRef idx="2">
+            <a:schemeClr val="accent1">
+              <a:shade val="50000"/>
+            </a:schemeClr>
+          </a:lnRef>
+          <a:fillRef idx="1">
+            <a:schemeClr val="accent1"/>
+          </a:fillRef>
+          <a:effectRef idx="0">
+            <a:schemeClr val="accent1"/>
+          </a:effectRef>
+          <a:fontRef idx="minor">
+            <a:schemeClr val="lt1"/>
+          </a:fontRef>
+        </p:style>
+        <p:txBody>
+          <a:bodyPr rtlCol="0" anchor="ctr"/>
+          <a:lstStyle/>
+          <a:p>
+            <a:pPr algn="ctr"/>
+            <a:r>
+              <a:rPr lang="en-US" sz="900" b="1" dirty="0" smtClean="0">
+                <a:solidFill>
+                  <a:schemeClr val="tx1"/>
+                </a:solidFill>
+              </a:rPr>
+              <a:t>Peer (Caller)</a:t>
+            </a:r>
+          </a:p>
+          <a:p>
+            <a:pPr algn="ctr"/>
+            <a:r>
+              <a:rPr lang="en-US" sz="900" dirty="0" smtClean="0">
+                <a:solidFill>
+                  <a:schemeClr val="tx1"/>
+                </a:solidFill>
+              </a:rPr>
+              <a:t>- Generates caller SDP, ICE candidate s</a:t>
+            </a:r>
+            <a:endParaRPr lang="en-US" sz="900" dirty="0" smtClean="0">
+              <a:solidFill>
+                <a:schemeClr val="tx1"/>
+              </a:solidFill>
+            </a:endParaRPr>
+          </a:p>
+          <a:p>
+            <a:pPr algn="ctr"/>
+            <a:endParaRPr lang="en-US" sz="900" dirty="0">
+              <a:solidFill>
+                <a:schemeClr val="tx1"/>
+              </a:solidFill>
+            </a:endParaRPr>
+          </a:p>
+        </p:txBody>
+      </p:sp>
+      <p:sp>
+        <p:nvSpPr>
+          <p:cNvPr id="6" name="Rectangle 5"/>
+          <p:cNvSpPr/>
+          <p:nvPr/>
+        </p:nvSpPr>
+        <p:spPr>
+          <a:xfrm>
+            <a:off x="5943600" y="2057400"/>
+            <a:ext cx="914400" cy="914400"/>
+          </a:xfrm>
+          <a:prstGeom prst="rect">
+            <a:avLst/>
+          </a:prstGeom>
+          <a:solidFill>
+            <a:schemeClr val="bg1"/>
+          </a:solidFill>
+        </p:spPr>
+        <p:style>
+          <a:lnRef idx="2">
+            <a:schemeClr val="accent1">
+              <a:shade val="50000"/>
+            </a:schemeClr>
+          </a:lnRef>
+          <a:fillRef idx="1">
+            <a:schemeClr val="accent1"/>
+          </a:fillRef>
+          <a:effectRef idx="0">
+            <a:schemeClr val="accent1"/>
+          </a:effectRef>
+          <a:fontRef idx="minor">
+            <a:schemeClr val="lt1"/>
+          </a:fontRef>
+        </p:style>
+        <p:txBody>
+          <a:bodyPr rtlCol="0" anchor="ctr"/>
+          <a:lstStyle/>
+          <a:p>
+            <a:pPr algn="ctr"/>
+            <a:r>
+              <a:rPr lang="en-US" sz="900" b="1" dirty="0" smtClean="0">
+                <a:solidFill>
+                  <a:schemeClr val="tx1"/>
+                </a:solidFill>
+              </a:rPr>
+              <a:t>Peer (</a:t>
+            </a:r>
+            <a:r>
+              <a:rPr lang="en-US" sz="900" b="1" dirty="0" err="1" smtClean="0">
+                <a:solidFill>
+                  <a:schemeClr val="tx1"/>
+                </a:solidFill>
+              </a:rPr>
+              <a:t>Callee</a:t>
+            </a:r>
+            <a:r>
+              <a:rPr lang="en-US" sz="900" b="1" dirty="0" smtClean="0">
+                <a:solidFill>
+                  <a:schemeClr val="tx1"/>
+                </a:solidFill>
+              </a:rPr>
+              <a:t>)</a:t>
+            </a:r>
+          </a:p>
+          <a:p>
+            <a:pPr algn="ctr"/>
+            <a:r>
+              <a:rPr lang="en-US" sz="900" dirty="0" smtClean="0">
+                <a:solidFill>
+                  <a:schemeClr val="tx1"/>
+                </a:solidFill>
+              </a:rPr>
+              <a:t>- Generates </a:t>
+            </a:r>
+            <a:r>
+              <a:rPr lang="en-US" sz="900" dirty="0" err="1" smtClean="0">
+                <a:solidFill>
+                  <a:schemeClr val="tx1"/>
+                </a:solidFill>
+              </a:rPr>
+              <a:t>callee</a:t>
+            </a:r>
+            <a:r>
+              <a:rPr lang="en-US" sz="900" dirty="0" smtClean="0">
+                <a:solidFill>
+                  <a:schemeClr val="tx1"/>
+                </a:solidFill>
+              </a:rPr>
+              <a:t> SDP, ICE candidates</a:t>
+            </a:r>
+            <a:endParaRPr lang="en-US" sz="900" dirty="0">
+              <a:solidFill>
+                <a:schemeClr val="tx1"/>
+              </a:solidFill>
+            </a:endParaRPr>
+          </a:p>
+        </p:txBody>
+      </p:sp>
+      <p:cxnSp>
+        <p:nvCxnSpPr>
+          <p:cNvPr id="7" name="Straight Arrow Connector 6"/>
+          <p:cNvCxnSpPr>
+            <a:stCxn id="5" idx="3"/>
+            <a:endCxn id="4" idx="1"/>
+          </p:cNvCxnSpPr>
+          <p:nvPr/>
+        </p:nvCxnSpPr>
+        <p:spPr>
+          <a:xfrm>
+            <a:off x="2609850" y="2514600"/>
+            <a:ext cx="1424669" cy="0"/>
+          </a:xfrm>
+          <a:prstGeom prst="straightConnector1">
+            <a:avLst/>
+          </a:prstGeom>
+          <a:ln>
+            <a:tailEnd type="arrow"/>
+          </a:ln>
+        </p:spPr>
+        <p:style>
+          <a:lnRef idx="1">
+            <a:schemeClr val="accent1"/>
+          </a:lnRef>
+          <a:fillRef idx="0">
+            <a:schemeClr val="accent1"/>
+          </a:fillRef>
+          <a:effectRef idx="0">
+            <a:schemeClr val="accent1"/>
+          </a:effectRef>
+          <a:fontRef idx="minor">
+            <a:schemeClr val="tx1"/>
+          </a:fontRef>
+        </p:style>
+      </p:cxnSp>
+      <p:cxnSp>
+        <p:nvCxnSpPr>
+          <p:cNvPr id="10" name="Straight Arrow Connector 9"/>
+          <p:cNvCxnSpPr>
+            <a:stCxn id="4" idx="3"/>
+            <a:endCxn id="6" idx="1"/>
+          </p:cNvCxnSpPr>
+          <p:nvPr/>
+        </p:nvCxnSpPr>
+        <p:spPr>
+          <a:xfrm>
+            <a:off x="4948919" y="2514600"/>
+            <a:ext cx="994681" cy="0"/>
+          </a:xfrm>
+          <a:prstGeom prst="straightConnector1">
+            <a:avLst/>
+          </a:prstGeom>
+          <a:ln>
+            <a:tailEnd type="arrow"/>
+          </a:ln>
+        </p:spPr>
+        <p:style>
+          <a:lnRef idx="1">
+            <a:schemeClr val="accent1"/>
+          </a:lnRef>
+          <a:fillRef idx="0">
+            <a:schemeClr val="accent1"/>
+          </a:fillRef>
+          <a:effectRef idx="0">
+            <a:schemeClr val="accent1"/>
+          </a:effectRef>
+          <a:fontRef idx="minor">
+            <a:schemeClr val="tx1"/>
+          </a:fontRef>
+        </p:style>
+      </p:cxnSp>
+      <p:sp>
+        <p:nvSpPr>
+          <p:cNvPr id="15" name="Rectangle 14"/>
+          <p:cNvSpPr/>
+          <p:nvPr/>
+        </p:nvSpPr>
+        <p:spPr>
+          <a:xfrm>
+            <a:off x="3405869" y="3733800"/>
+            <a:ext cx="2537731" cy="1295400"/>
+          </a:xfrm>
+          <a:prstGeom prst="rect">
+            <a:avLst/>
+          </a:prstGeom>
+          <a:solidFill>
+            <a:schemeClr val="bg1"/>
+          </a:solidFill>
+        </p:spPr>
+        <p:style>
+          <a:lnRef idx="2">
+            <a:schemeClr val="accent1">
+              <a:shade val="50000"/>
+            </a:schemeClr>
+          </a:lnRef>
+          <a:fillRef idx="1">
+            <a:schemeClr val="accent1"/>
+          </a:fillRef>
+          <a:effectRef idx="0">
+            <a:schemeClr val="accent1"/>
+          </a:effectRef>
+          <a:fontRef idx="minor">
+            <a:schemeClr val="lt1"/>
+          </a:fontRef>
+        </p:style>
+        <p:txBody>
+          <a:bodyPr rtlCol="0" anchor="ctr"/>
+          <a:lstStyle/>
+          <a:p>
+            <a:pPr algn="ctr"/>
+            <a:r>
+              <a:rPr lang="en-US" sz="900" b="1" dirty="0" smtClean="0">
+                <a:solidFill>
+                  <a:schemeClr val="tx1"/>
+                </a:solidFill>
+              </a:rPr>
+              <a:t>Connection</a:t>
+            </a:r>
+          </a:p>
+          <a:p>
+            <a:pPr marL="171450" indent="-171450" algn="ctr">
+              <a:buFontTx/>
+              <a:buChar char="-"/>
+            </a:pPr>
+            <a:r>
+              <a:rPr lang="en-US" sz="900" dirty="0" err="1" smtClean="0">
+                <a:solidFill>
+                  <a:schemeClr val="tx1"/>
+                </a:solidFill>
+              </a:rPr>
+              <a:t>onCallerMsg</a:t>
+            </a:r>
+            <a:r>
+              <a:rPr lang="en-US" sz="900" dirty="0" smtClean="0">
+                <a:solidFill>
+                  <a:schemeClr val="tx1"/>
+                </a:solidFill>
+              </a:rPr>
+              <a:t>(id, </a:t>
+            </a:r>
+            <a:r>
+              <a:rPr lang="en-US" sz="900" dirty="0" err="1" smtClean="0">
+                <a:solidFill>
+                  <a:schemeClr val="tx1"/>
+                </a:solidFill>
+              </a:rPr>
+              <a:t>roomId</a:t>
+            </a:r>
+            <a:r>
+              <a:rPr lang="en-US" sz="900" dirty="0" smtClean="0">
+                <a:solidFill>
+                  <a:schemeClr val="tx1"/>
+                </a:solidFill>
+              </a:rPr>
+              <a:t>, payload)</a:t>
+            </a:r>
+          </a:p>
+          <a:p>
+            <a:pPr marL="171450" indent="-171450" algn="ctr">
+              <a:buFontTx/>
+              <a:buChar char="-"/>
+            </a:pPr>
+            <a:r>
+              <a:rPr lang="en-US" sz="900" dirty="0" err="1" smtClean="0">
+                <a:solidFill>
+                  <a:schemeClr val="tx1"/>
+                </a:solidFill>
+              </a:rPr>
+              <a:t>onCalleeMsg</a:t>
+            </a:r>
+            <a:r>
+              <a:rPr lang="en-US" sz="900" dirty="0" smtClean="0">
+                <a:solidFill>
+                  <a:schemeClr val="tx1"/>
+                </a:solidFill>
+              </a:rPr>
+              <a:t>(id, </a:t>
+            </a:r>
+            <a:r>
+              <a:rPr lang="en-US" sz="900" dirty="0" err="1" smtClean="0">
+                <a:solidFill>
+                  <a:schemeClr val="tx1"/>
+                </a:solidFill>
+              </a:rPr>
+              <a:t>roomId</a:t>
+            </a:r>
+            <a:r>
+              <a:rPr lang="en-US" sz="900" dirty="0" smtClean="0">
+                <a:solidFill>
+                  <a:schemeClr val="tx1"/>
+                </a:solidFill>
+              </a:rPr>
+              <a:t>, payload)</a:t>
+            </a:r>
+          </a:p>
+          <a:p>
+            <a:pPr marL="171450" indent="-171450" algn="ctr">
+              <a:buFontTx/>
+              <a:buChar char="-"/>
+            </a:pPr>
+            <a:r>
+              <a:rPr lang="en-US" sz="900" dirty="0" err="1" smtClean="0">
+                <a:solidFill>
+                  <a:schemeClr val="tx1"/>
+                </a:solidFill>
+              </a:rPr>
+              <a:t>initiateConnection</a:t>
+            </a:r>
+            <a:r>
+              <a:rPr lang="en-US" sz="900" dirty="0" smtClean="0">
+                <a:solidFill>
+                  <a:schemeClr val="tx1"/>
+                </a:solidFill>
+              </a:rPr>
+              <a:t>(</a:t>
+            </a:r>
+            <a:r>
+              <a:rPr lang="en-US" sz="900" dirty="0" err="1" smtClean="0">
+                <a:solidFill>
+                  <a:schemeClr val="tx1"/>
+                </a:solidFill>
+              </a:rPr>
+              <a:t>src</a:t>
+            </a:r>
+            <a:r>
+              <a:rPr lang="en-US" sz="900" dirty="0" smtClean="0">
+                <a:solidFill>
+                  <a:schemeClr val="tx1"/>
+                </a:solidFill>
+              </a:rPr>
+              <a:t>, </a:t>
+            </a:r>
+            <a:r>
+              <a:rPr lang="en-US" sz="900" dirty="0" err="1" smtClean="0">
+                <a:solidFill>
+                  <a:schemeClr val="tx1"/>
+                </a:solidFill>
+              </a:rPr>
+              <a:t>dst</a:t>
+            </a:r>
+            <a:r>
+              <a:rPr lang="en-US" sz="900" dirty="0" smtClean="0">
+                <a:solidFill>
+                  <a:schemeClr val="tx1"/>
+                </a:solidFill>
+              </a:rPr>
+              <a:t>, payload)</a:t>
+            </a:r>
+          </a:p>
+          <a:p>
+            <a:pPr marL="171450" indent="-171450" algn="ctr">
+              <a:buFontTx/>
+              <a:buChar char="-"/>
+            </a:pPr>
+            <a:r>
+              <a:rPr lang="en-US" sz="900" dirty="0" err="1" smtClean="0">
+                <a:solidFill>
+                  <a:schemeClr val="tx1"/>
+                </a:solidFill>
+              </a:rPr>
+              <a:t>sendCallerAResponse</a:t>
+            </a:r>
+            <a:r>
+              <a:rPr lang="en-US" sz="900" dirty="0" smtClean="0">
+                <a:solidFill>
+                  <a:schemeClr val="tx1"/>
+                </a:solidFill>
+              </a:rPr>
+              <a:t>(from, data)</a:t>
+            </a:r>
+          </a:p>
+          <a:p>
+            <a:pPr marL="171450" indent="-171450" algn="ctr">
+              <a:buFontTx/>
+              <a:buChar char="-"/>
+            </a:pPr>
+            <a:r>
+              <a:rPr lang="en-US" sz="900" dirty="0" err="1" smtClean="0">
+                <a:solidFill>
+                  <a:schemeClr val="tx1"/>
+                </a:solidFill>
+              </a:rPr>
+              <a:t>sendCalleeAResponse</a:t>
+            </a:r>
+            <a:r>
+              <a:rPr lang="en-US" sz="900" dirty="0" smtClean="0">
+                <a:solidFill>
+                  <a:schemeClr val="tx1"/>
+                </a:solidFill>
+              </a:rPr>
+              <a:t>(to, data)</a:t>
+            </a:r>
+            <a:endParaRPr lang="en-US" sz="900" dirty="0">
+              <a:solidFill>
+                <a:schemeClr val="tx1"/>
+              </a:solidFill>
+            </a:endParaRPr>
+          </a:p>
+          <a:p>
+            <a:pPr marL="171450" indent="-171450" algn="ctr">
+              <a:buFontTx/>
+              <a:buChar char="-"/>
+            </a:pPr>
+            <a:endParaRPr lang="en-US" sz="900" dirty="0" smtClean="0">
+              <a:solidFill>
+                <a:schemeClr val="tx1"/>
+              </a:solidFill>
+            </a:endParaRPr>
+          </a:p>
+        </p:txBody>
+      </p:sp>
+    </p:spTree>
+    <p:extLst>
+      <p:ext uri="{BB962C8B-B14F-4D97-AF65-F5344CB8AC3E}">
+        <p14:creationId xmlns:p14="http://schemas.microsoft.com/office/powerpoint/2010/main" val="2611205755"/>
+      </p:ext>
+    </p:extLst>
+  </p:cSld>
+  <p:clrMapOvr>
+    <a:masterClrMapping/>
+  </p:clrMapOvr>
+</p:sld>
+</file>
+
+<file path=ppt/slides/slide5.xml><?xml version="1.0" encoding="utf-8"?>
+<p:sld xmlns:a="http://schemas.openxmlformats.org/drawingml/2006/main" xmlns:r="http://schemas.openxmlformats.org/officeDocument/2006/relationships" xmlns:p="http://schemas.openxmlformats.org/presentationml/2006/main">
+  <p:cSld>
+    <p:spTree>
+      <p:nvGrpSpPr>
+        <p:cNvPr id="1" name=""/>
+        <p:cNvGrpSpPr/>
+        <p:nvPr/>
+      </p:nvGrpSpPr>
+      <p:grpSpPr>
+        <a:xfrm>
+          <a:off x="0" y="0"/>
+          <a:ext cx="0" cy="0"/>
+          <a:chOff x="0" y="0"/>
+          <a:chExt cx="0" cy="0"/>
+        </a:xfrm>
+      </p:grpSpPr>
+      <p:sp>
+        <p:nvSpPr>
+          <p:cNvPr id="2" name="Title 1"/>
+          <p:cNvSpPr>
+            <a:spLocks noGrp="1"/>
+          </p:cNvSpPr>
+          <p:nvPr>
+            <p:ph type="title"/>
+          </p:nvPr>
+        </p:nvSpPr>
+        <p:spPr/>
+        <p:txBody>
+          <a:bodyPr/>
+          <a:lstStyle/>
+          <a:p>
+            <a:r>
+              <a:rPr lang="en-US" dirty="0" smtClean="0"/>
+              <a:t>TODO</a:t>
+            </a:r>
+            <a:endParaRPr lang="en-US" dirty="0"/>
+          </a:p>
+        </p:txBody>
+      </p:sp>
+      <p:sp>
+        <p:nvSpPr>
+          <p:cNvPr id="3" name="Content Placeholder 2"/>
+          <p:cNvSpPr>
+            <a:spLocks noGrp="1"/>
+          </p:cNvSpPr>
+          <p:nvPr>
+            <p:ph idx="1"/>
+          </p:nvPr>
+        </p:nvSpPr>
+        <p:spPr/>
+        <p:txBody>
+          <a:bodyPr/>
+          <a:lstStyle/>
+          <a:p>
+            <a:r>
+              <a:rPr lang="en-US" dirty="0" smtClean="0"/>
+              <a:t>Conversion to </a:t>
+            </a:r>
+            <a:r>
+              <a:rPr lang="en-US" smtClean="0"/>
+              <a:t>TypeScript</a:t>
+            </a:r>
+            <a:endParaRPr lang="en-US" dirty="0"/>
+          </a:p>
+        </p:txBody>
+      </p:sp>
+    </p:spTree>
+    <p:extLst>
+      <p:ext uri="{BB962C8B-B14F-4D97-AF65-F5344CB8AC3E}">
+        <p14:creationId xmlns:p14="http://schemas.microsoft.com/office/powerpoint/2010/main" val="3556545664"/>
       </p:ext>
     </p:extLst>
   </p:cSld>

</xml_diff>